<commit_message>
First full cut of the DAG diagram added
</commit_message>
<xml_diff>
--- a/figures/prompt_dag_1.pptx
+++ b/figures/prompt_dag_1.pptx
@@ -7,7 +7,7 @@
   <p:sldIdLst>
     <p:sldId id="256" r:id="rId3"/>
   </p:sldIdLst>
-  <p:sldSz cx="12192000" cy="6858000"/>
+  <p:sldSz cx="8413115" cy="3200400"/>
   <p:notesSz cx="7103745" cy="10234295"/>
   <p:defaultTextStyle>
     <a:defPPr>
@@ -136,15 +136,15 @@
         </p:nvSpPr>
         <p:spPr>
           <a:xfrm>
-            <a:off x="1524000" y="1122363"/>
-            <a:ext cx="9144000" cy="2387600"/>
+            <a:off x="1051728" y="523879"/>
+            <a:ext cx="6310371" cy="1114447"/>
           </a:xfrm>
         </p:spPr>
         <p:txBody>
           <a:bodyPr anchor="b"/>
           <a:lstStyle>
             <a:lvl1pPr algn="ctr">
-              <a:defRPr sz="6000"/>
+              <a:defRPr sz="2800"/>
             </a:lvl1pPr>
           </a:lstStyle>
           <a:p>
@@ -168,8 +168,8 @@
         </p:nvSpPr>
         <p:spPr>
           <a:xfrm>
-            <a:off x="1524000" y="3602038"/>
-            <a:ext cx="9144000" cy="1655762"/>
+            <a:off x="1051728" y="1681304"/>
+            <a:ext cx="6310371" cy="772851"/>
           </a:xfrm>
         </p:spPr>
         <p:txBody>
@@ -177,39 +177,39 @@
           <a:lstStyle>
             <a:lvl1pPr marL="0" indent="0" algn="ctr">
               <a:buNone/>
-              <a:defRPr sz="2400"/>
+              <a:defRPr sz="1120"/>
             </a:lvl1pPr>
-            <a:lvl2pPr marL="457200" indent="0" algn="ctr">
-              <a:buNone/>
-              <a:defRPr sz="2000"/>
+            <a:lvl2pPr marL="213360" indent="0" algn="ctr">
+              <a:buNone/>
+              <a:defRPr sz="935"/>
             </a:lvl2pPr>
-            <a:lvl3pPr marL="914400" indent="0" algn="ctr">
-              <a:buNone/>
-              <a:defRPr sz="1800"/>
+            <a:lvl3pPr marL="426720" indent="0" algn="ctr">
+              <a:buNone/>
+              <a:defRPr sz="840"/>
             </a:lvl3pPr>
-            <a:lvl4pPr marL="1371600" indent="0" algn="ctr">
-              <a:buNone/>
-              <a:defRPr sz="1600"/>
+            <a:lvl4pPr marL="640080" indent="0" algn="ctr">
+              <a:buNone/>
+              <a:defRPr sz="740"/>
             </a:lvl4pPr>
-            <a:lvl5pPr marL="1828800" indent="0" algn="ctr">
-              <a:buNone/>
-              <a:defRPr sz="1600"/>
+            <a:lvl5pPr marL="853440" indent="0" algn="ctr">
+              <a:buNone/>
+              <a:defRPr sz="740"/>
             </a:lvl5pPr>
-            <a:lvl6pPr marL="2286000" indent="0" algn="ctr">
-              <a:buNone/>
-              <a:defRPr sz="1600"/>
+            <a:lvl6pPr marL="1067435" indent="0" algn="ctr">
+              <a:buNone/>
+              <a:defRPr sz="740"/>
             </a:lvl6pPr>
-            <a:lvl7pPr marL="2743200" indent="0" algn="ctr">
-              <a:buNone/>
-              <a:defRPr sz="1600"/>
+            <a:lvl7pPr marL="1280160" indent="0" algn="ctr">
+              <a:buNone/>
+              <a:defRPr sz="740"/>
             </a:lvl7pPr>
-            <a:lvl8pPr marL="3200400" indent="0" algn="ctr">
-              <a:buNone/>
-              <a:defRPr sz="1600"/>
+            <a:lvl8pPr marL="1493520" indent="0" algn="ctr">
+              <a:buNone/>
+              <a:defRPr sz="740"/>
             </a:lvl8pPr>
-            <a:lvl9pPr marL="3657600" indent="0" algn="ctr">
-              <a:buNone/>
-              <a:defRPr sz="1600"/>
+            <a:lvl9pPr marL="1707515" indent="0" algn="ctr">
+              <a:buNone/>
+              <a:defRPr sz="740"/>
             </a:lvl9pPr>
           </a:lstStyle>
           <a:p>
@@ -321,8 +321,8 @@
         </p:nvSpPr>
         <p:spPr>
           <a:xfrm>
-            <a:off x="838200" y="365125"/>
-            <a:ext cx="10515600" cy="5811838"/>
+            <a:off x="578451" y="170427"/>
+            <a:ext cx="7256927" cy="2712760"/>
           </a:xfrm>
         </p:spPr>
         <p:txBody>
@@ -637,15 +637,15 @@
         </p:nvSpPr>
         <p:spPr>
           <a:xfrm>
-            <a:off x="831850" y="1709738"/>
-            <a:ext cx="10515600" cy="2852737"/>
+            <a:off x="574068" y="798045"/>
+            <a:ext cx="7256927" cy="1331556"/>
           </a:xfrm>
         </p:spPr>
         <p:txBody>
           <a:bodyPr anchor="b"/>
           <a:lstStyle>
             <a:lvl1pPr>
-              <a:defRPr sz="6000"/>
+              <a:defRPr sz="2800"/>
             </a:lvl1pPr>
           </a:lstStyle>
           <a:p>
@@ -669,8 +669,8 @@
         </p:nvSpPr>
         <p:spPr>
           <a:xfrm>
-            <a:off x="831850" y="4589463"/>
-            <a:ext cx="10515600" cy="1500187"/>
+            <a:off x="574068" y="2142198"/>
+            <a:ext cx="7256927" cy="700234"/>
           </a:xfrm>
         </p:spPr>
         <p:txBody>
@@ -678,7 +678,7 @@
           <a:lstStyle>
             <a:lvl1pPr marL="0" indent="0">
               <a:buNone/>
-              <a:defRPr sz="2400">
+              <a:defRPr sz="1120">
                 <a:solidFill>
                   <a:schemeClr val="tx1">
                     <a:tint val="75000"/>
@@ -686,9 +686,9 @@
                 </a:solidFill>
               </a:defRPr>
             </a:lvl1pPr>
-            <a:lvl2pPr marL="457200" indent="0">
-              <a:buNone/>
-              <a:defRPr sz="2000">
+            <a:lvl2pPr marL="213360" indent="0">
+              <a:buNone/>
+              <a:defRPr sz="935">
                 <a:solidFill>
                   <a:schemeClr val="tx1">
                     <a:tint val="75000"/>
@@ -696,9 +696,9 @@
                 </a:solidFill>
               </a:defRPr>
             </a:lvl2pPr>
-            <a:lvl3pPr marL="914400" indent="0">
-              <a:buNone/>
-              <a:defRPr sz="1800">
+            <a:lvl3pPr marL="426720" indent="0">
+              <a:buNone/>
+              <a:defRPr sz="840">
                 <a:solidFill>
                   <a:schemeClr val="tx1">
                     <a:tint val="75000"/>
@@ -706,9 +706,9 @@
                 </a:solidFill>
               </a:defRPr>
             </a:lvl3pPr>
-            <a:lvl4pPr marL="1371600" indent="0">
-              <a:buNone/>
-              <a:defRPr sz="1600">
+            <a:lvl4pPr marL="640080" indent="0">
+              <a:buNone/>
+              <a:defRPr sz="740">
                 <a:solidFill>
                   <a:schemeClr val="tx1">
                     <a:tint val="75000"/>
@@ -716,9 +716,9 @@
                 </a:solidFill>
               </a:defRPr>
             </a:lvl4pPr>
-            <a:lvl5pPr marL="1828800" indent="0">
-              <a:buNone/>
-              <a:defRPr sz="1600">
+            <a:lvl5pPr marL="853440" indent="0">
+              <a:buNone/>
+              <a:defRPr sz="740">
                 <a:solidFill>
                   <a:schemeClr val="tx1">
                     <a:tint val="75000"/>
@@ -726,9 +726,9 @@
                 </a:solidFill>
               </a:defRPr>
             </a:lvl5pPr>
-            <a:lvl6pPr marL="2286000" indent="0">
-              <a:buNone/>
-              <a:defRPr sz="1600">
+            <a:lvl6pPr marL="1067435" indent="0">
+              <a:buNone/>
+              <a:defRPr sz="740">
                 <a:solidFill>
                   <a:schemeClr val="tx1">
                     <a:tint val="75000"/>
@@ -736,9 +736,9 @@
                 </a:solidFill>
               </a:defRPr>
             </a:lvl6pPr>
-            <a:lvl7pPr marL="2743200" indent="0">
-              <a:buNone/>
-              <a:defRPr sz="1600">
+            <a:lvl7pPr marL="1280160" indent="0">
+              <a:buNone/>
+              <a:defRPr sz="740">
                 <a:solidFill>
                   <a:schemeClr val="tx1">
                     <a:tint val="75000"/>
@@ -746,9 +746,9 @@
                 </a:solidFill>
               </a:defRPr>
             </a:lvl7pPr>
-            <a:lvl8pPr marL="3200400" indent="0">
-              <a:buNone/>
-              <a:defRPr sz="1600">
+            <a:lvl8pPr marL="1493520" indent="0">
+              <a:buNone/>
+              <a:defRPr sz="740">
                 <a:solidFill>
                   <a:schemeClr val="tx1">
                     <a:tint val="75000"/>
@@ -756,9 +756,9 @@
                 </a:solidFill>
               </a:defRPr>
             </a:lvl8pPr>
-            <a:lvl9pPr marL="3657600" indent="0">
-              <a:buNone/>
-              <a:defRPr sz="1600">
+            <a:lvl9pPr marL="1707515" indent="0">
+              <a:buNone/>
+              <a:defRPr sz="740">
                 <a:solidFill>
                   <a:schemeClr val="tx1">
                     <a:tint val="75000"/>
@@ -900,8 +900,8 @@
         </p:nvSpPr>
         <p:spPr>
           <a:xfrm>
-            <a:off x="838200" y="1825625"/>
-            <a:ext cx="5181600" cy="4351338"/>
+            <a:off x="578451" y="852137"/>
+            <a:ext cx="3575877" cy="2031050"/>
           </a:xfrm>
         </p:spPr>
         <p:txBody>
@@ -961,8 +961,8 @@
         </p:nvSpPr>
         <p:spPr>
           <a:xfrm>
-            <a:off x="6172200" y="1825625"/>
-            <a:ext cx="5181600" cy="4351338"/>
+            <a:off x="4259500" y="852137"/>
+            <a:ext cx="3575877" cy="2031050"/>
           </a:xfrm>
         </p:spPr>
         <p:txBody>
@@ -1110,8 +1110,8 @@
         </p:nvSpPr>
         <p:spPr>
           <a:xfrm>
-            <a:off x="839788" y="365125"/>
-            <a:ext cx="10515600" cy="1325563"/>
+            <a:off x="579547" y="170427"/>
+            <a:ext cx="7256927" cy="618726"/>
           </a:xfrm>
         </p:spPr>
         <p:txBody>
@@ -1138,8 +1138,8 @@
         </p:nvSpPr>
         <p:spPr>
           <a:xfrm>
-            <a:off x="839788" y="1681163"/>
-            <a:ext cx="5157787" cy="823912"/>
+            <a:off x="579547" y="784707"/>
+            <a:ext cx="3559443" cy="384573"/>
           </a:xfrm>
         </p:spPr>
         <p:txBody>
@@ -1147,39 +1147,39 @@
           <a:lstStyle>
             <a:lvl1pPr marL="0" indent="0">
               <a:buNone/>
-              <a:defRPr sz="2400" b="1"/>
+              <a:defRPr sz="1120" b="1"/>
             </a:lvl1pPr>
-            <a:lvl2pPr marL="457200" indent="0">
-              <a:buNone/>
-              <a:defRPr sz="2000" b="1"/>
+            <a:lvl2pPr marL="213360" indent="0">
+              <a:buNone/>
+              <a:defRPr sz="935" b="1"/>
             </a:lvl2pPr>
-            <a:lvl3pPr marL="914400" indent="0">
-              <a:buNone/>
-              <a:defRPr sz="1800" b="1"/>
+            <a:lvl3pPr marL="426720" indent="0">
+              <a:buNone/>
+              <a:defRPr sz="840" b="1"/>
             </a:lvl3pPr>
-            <a:lvl4pPr marL="1371600" indent="0">
-              <a:buNone/>
-              <a:defRPr sz="1600" b="1"/>
+            <a:lvl4pPr marL="640080" indent="0">
+              <a:buNone/>
+              <a:defRPr sz="740" b="1"/>
             </a:lvl4pPr>
-            <a:lvl5pPr marL="1828800" indent="0">
-              <a:buNone/>
-              <a:defRPr sz="1600" b="1"/>
+            <a:lvl5pPr marL="853440" indent="0">
+              <a:buNone/>
+              <a:defRPr sz="740" b="1"/>
             </a:lvl5pPr>
-            <a:lvl6pPr marL="2286000" indent="0">
-              <a:buNone/>
-              <a:defRPr sz="1600" b="1"/>
+            <a:lvl6pPr marL="1067435" indent="0">
+              <a:buNone/>
+              <a:defRPr sz="740" b="1"/>
             </a:lvl6pPr>
-            <a:lvl7pPr marL="2743200" indent="0">
-              <a:buNone/>
-              <a:defRPr sz="1600" b="1"/>
+            <a:lvl7pPr marL="1280160" indent="0">
+              <a:buNone/>
+              <a:defRPr sz="740" b="1"/>
             </a:lvl7pPr>
-            <a:lvl8pPr marL="3200400" indent="0">
-              <a:buNone/>
-              <a:defRPr sz="1600" b="1"/>
+            <a:lvl8pPr marL="1493520" indent="0">
+              <a:buNone/>
+              <a:defRPr sz="740" b="1"/>
             </a:lvl8pPr>
-            <a:lvl9pPr marL="3657600" indent="0">
-              <a:buNone/>
-              <a:defRPr sz="1600" b="1"/>
+            <a:lvl9pPr marL="1707515" indent="0">
+              <a:buNone/>
+              <a:defRPr sz="740" b="1"/>
             </a:lvl9pPr>
           </a:lstStyle>
           <a:p>
@@ -1204,8 +1204,8 @@
         </p:nvSpPr>
         <p:spPr>
           <a:xfrm>
-            <a:off x="839788" y="2505075"/>
-            <a:ext cx="5157787" cy="3684588"/>
+            <a:off x="579547" y="1169280"/>
+            <a:ext cx="3559443" cy="1719835"/>
           </a:xfrm>
         </p:spPr>
         <p:txBody>
@@ -1265,8 +1265,8 @@
         </p:nvSpPr>
         <p:spPr>
           <a:xfrm>
-            <a:off x="6172200" y="1681163"/>
-            <a:ext cx="5183188" cy="823912"/>
+            <a:off x="4259500" y="784707"/>
+            <a:ext cx="3576973" cy="384573"/>
           </a:xfrm>
         </p:spPr>
         <p:txBody>
@@ -1274,39 +1274,39 @@
           <a:lstStyle>
             <a:lvl1pPr marL="0" indent="0">
               <a:buNone/>
-              <a:defRPr sz="2400" b="1"/>
+              <a:defRPr sz="1120" b="1"/>
             </a:lvl1pPr>
-            <a:lvl2pPr marL="457200" indent="0">
-              <a:buNone/>
-              <a:defRPr sz="2000" b="1"/>
+            <a:lvl2pPr marL="213360" indent="0">
+              <a:buNone/>
+              <a:defRPr sz="935" b="1"/>
             </a:lvl2pPr>
-            <a:lvl3pPr marL="914400" indent="0">
-              <a:buNone/>
-              <a:defRPr sz="1800" b="1"/>
+            <a:lvl3pPr marL="426720" indent="0">
+              <a:buNone/>
+              <a:defRPr sz="840" b="1"/>
             </a:lvl3pPr>
-            <a:lvl4pPr marL="1371600" indent="0">
-              <a:buNone/>
-              <a:defRPr sz="1600" b="1"/>
+            <a:lvl4pPr marL="640080" indent="0">
+              <a:buNone/>
+              <a:defRPr sz="740" b="1"/>
             </a:lvl4pPr>
-            <a:lvl5pPr marL="1828800" indent="0">
-              <a:buNone/>
-              <a:defRPr sz="1600" b="1"/>
+            <a:lvl5pPr marL="853440" indent="0">
+              <a:buNone/>
+              <a:defRPr sz="740" b="1"/>
             </a:lvl5pPr>
-            <a:lvl6pPr marL="2286000" indent="0">
-              <a:buNone/>
-              <a:defRPr sz="1600" b="1"/>
+            <a:lvl6pPr marL="1067435" indent="0">
+              <a:buNone/>
+              <a:defRPr sz="740" b="1"/>
             </a:lvl6pPr>
-            <a:lvl7pPr marL="2743200" indent="0">
-              <a:buNone/>
-              <a:defRPr sz="1600" b="1"/>
+            <a:lvl7pPr marL="1280160" indent="0">
+              <a:buNone/>
+              <a:defRPr sz="740" b="1"/>
             </a:lvl7pPr>
-            <a:lvl8pPr marL="3200400" indent="0">
-              <a:buNone/>
-              <a:defRPr sz="1600" b="1"/>
+            <a:lvl8pPr marL="1493520" indent="0">
+              <a:buNone/>
+              <a:defRPr sz="740" b="1"/>
             </a:lvl8pPr>
-            <a:lvl9pPr marL="3657600" indent="0">
-              <a:buNone/>
-              <a:defRPr sz="1600" b="1"/>
+            <a:lvl9pPr marL="1707515" indent="0">
+              <a:buNone/>
+              <a:defRPr sz="740" b="1"/>
             </a:lvl9pPr>
           </a:lstStyle>
           <a:p>
@@ -1331,8 +1331,8 @@
         </p:nvSpPr>
         <p:spPr>
           <a:xfrm>
-            <a:off x="6172200" y="2505075"/>
-            <a:ext cx="5183188" cy="3684588"/>
+            <a:off x="4259500" y="1169280"/>
+            <a:ext cx="3576973" cy="1719835"/>
           </a:xfrm>
         </p:spPr>
         <p:txBody>
@@ -1679,15 +1679,15 @@
         </p:nvSpPr>
         <p:spPr>
           <a:xfrm>
-            <a:off x="839788" y="457200"/>
-            <a:ext cx="3932237" cy="1600200"/>
+            <a:off x="579547" y="213405"/>
+            <a:ext cx="2713678" cy="746917"/>
           </a:xfrm>
         </p:spPr>
         <p:txBody>
           <a:bodyPr anchor="b"/>
           <a:lstStyle>
             <a:lvl1pPr>
-              <a:defRPr sz="3200"/>
+              <a:defRPr sz="1495"/>
             </a:lvl1pPr>
           </a:lstStyle>
           <a:p>
@@ -1711,8 +1711,8 @@
         </p:nvSpPr>
         <p:spPr>
           <a:xfrm>
-            <a:off x="5183188" y="987425"/>
-            <a:ext cx="6172200" cy="4873625"/>
+            <a:off x="3576973" y="460895"/>
+            <a:ext cx="4259500" cy="2274835"/>
           </a:xfrm>
         </p:spPr>
         <p:txBody>
@@ -1720,39 +1720,39 @@
           <a:lstStyle>
             <a:lvl1pPr marL="0" indent="0">
               <a:buNone/>
-              <a:defRPr sz="3200"/>
+              <a:defRPr sz="1495"/>
             </a:lvl1pPr>
-            <a:lvl2pPr marL="457200" indent="0">
-              <a:buNone/>
-              <a:defRPr sz="2800"/>
+            <a:lvl2pPr marL="213360" indent="0">
+              <a:buNone/>
+              <a:defRPr sz="1305"/>
             </a:lvl2pPr>
-            <a:lvl3pPr marL="914400" indent="0">
-              <a:buNone/>
-              <a:defRPr sz="2400"/>
+            <a:lvl3pPr marL="426720" indent="0">
+              <a:buNone/>
+              <a:defRPr sz="1120"/>
             </a:lvl3pPr>
-            <a:lvl4pPr marL="1371600" indent="0">
-              <a:buNone/>
-              <a:defRPr sz="2000"/>
+            <a:lvl4pPr marL="640080" indent="0">
+              <a:buNone/>
+              <a:defRPr sz="935"/>
             </a:lvl4pPr>
-            <a:lvl5pPr marL="1828800" indent="0">
-              <a:buNone/>
-              <a:defRPr sz="2000"/>
+            <a:lvl5pPr marL="853440" indent="0">
+              <a:buNone/>
+              <a:defRPr sz="935"/>
             </a:lvl5pPr>
-            <a:lvl6pPr marL="2286000" indent="0">
-              <a:buNone/>
-              <a:defRPr sz="2000"/>
+            <a:lvl6pPr marL="1067435" indent="0">
+              <a:buNone/>
+              <a:defRPr sz="935"/>
             </a:lvl6pPr>
-            <a:lvl7pPr marL="2743200" indent="0">
-              <a:buNone/>
-              <a:defRPr sz="2000"/>
+            <a:lvl7pPr marL="1280160" indent="0">
+              <a:buNone/>
+              <a:defRPr sz="935"/>
             </a:lvl7pPr>
-            <a:lvl8pPr marL="3200400" indent="0">
-              <a:buNone/>
-              <a:defRPr sz="2000"/>
+            <a:lvl8pPr marL="1493520" indent="0">
+              <a:buNone/>
+              <a:defRPr sz="935"/>
             </a:lvl8pPr>
-            <a:lvl9pPr marL="3657600" indent="0">
-              <a:buNone/>
-              <a:defRPr sz="2000"/>
+            <a:lvl9pPr marL="1707515" indent="0">
+              <a:buNone/>
+              <a:defRPr sz="935"/>
             </a:lvl9pPr>
           </a:lstStyle>
           <a:p>
@@ -1772,8 +1772,8 @@
         </p:nvSpPr>
         <p:spPr>
           <a:xfrm>
-            <a:off x="839788" y="2057400"/>
-            <a:ext cx="3932237" cy="3811588"/>
+            <a:off x="579547" y="960321"/>
+            <a:ext cx="2713678" cy="1779114"/>
           </a:xfrm>
         </p:spPr>
         <p:txBody>
@@ -1781,39 +1781,39 @@
           <a:lstStyle>
             <a:lvl1pPr marL="0" indent="0">
               <a:buNone/>
-              <a:defRPr sz="1600"/>
+              <a:defRPr sz="740"/>
             </a:lvl1pPr>
-            <a:lvl2pPr marL="457200" indent="0">
-              <a:buNone/>
-              <a:defRPr sz="1400"/>
+            <a:lvl2pPr marL="213360" indent="0">
+              <a:buNone/>
+              <a:defRPr sz="655"/>
             </a:lvl2pPr>
-            <a:lvl3pPr marL="914400" indent="0">
-              <a:buNone/>
-              <a:defRPr sz="1200"/>
+            <a:lvl3pPr marL="426720" indent="0">
+              <a:buNone/>
+              <a:defRPr sz="560"/>
             </a:lvl3pPr>
-            <a:lvl4pPr marL="1371600" indent="0">
-              <a:buNone/>
-              <a:defRPr sz="1000"/>
+            <a:lvl4pPr marL="640080" indent="0">
+              <a:buNone/>
+              <a:defRPr sz="465"/>
             </a:lvl4pPr>
-            <a:lvl5pPr marL="1828800" indent="0">
-              <a:buNone/>
-              <a:defRPr sz="1000"/>
+            <a:lvl5pPr marL="853440" indent="0">
+              <a:buNone/>
+              <a:defRPr sz="465"/>
             </a:lvl5pPr>
-            <a:lvl6pPr marL="2286000" indent="0">
-              <a:buNone/>
-              <a:defRPr sz="1000"/>
+            <a:lvl6pPr marL="1067435" indent="0">
+              <a:buNone/>
+              <a:defRPr sz="465"/>
             </a:lvl6pPr>
-            <a:lvl7pPr marL="2743200" indent="0">
-              <a:buNone/>
-              <a:defRPr sz="1000"/>
+            <a:lvl7pPr marL="1280160" indent="0">
+              <a:buNone/>
+              <a:defRPr sz="465"/>
             </a:lvl7pPr>
-            <a:lvl8pPr marL="3200400" indent="0">
-              <a:buNone/>
-              <a:defRPr sz="1000"/>
+            <a:lvl8pPr marL="1493520" indent="0">
+              <a:buNone/>
+              <a:defRPr sz="465"/>
             </a:lvl8pPr>
-            <a:lvl9pPr marL="3657600" indent="0">
-              <a:buNone/>
-              <a:defRPr sz="1000"/>
+            <a:lvl9pPr marL="1707515" indent="0">
+              <a:buNone/>
+              <a:defRPr sz="465"/>
             </a:lvl9pPr>
           </a:lstStyle>
           <a:p>
@@ -1933,8 +1933,8 @@
         </p:nvSpPr>
         <p:spPr>
           <a:xfrm>
-            <a:off x="8724900" y="365125"/>
-            <a:ext cx="2628900" cy="5811838"/>
+            <a:off x="6021146" y="170427"/>
+            <a:ext cx="1814232" cy="2712760"/>
           </a:xfrm>
         </p:spPr>
         <p:txBody>
@@ -1961,8 +1961,8 @@
         </p:nvSpPr>
         <p:spPr>
           <a:xfrm>
-            <a:off x="838200" y="365125"/>
-            <a:ext cx="7734300" cy="5811838"/>
+            <a:off x="578451" y="170427"/>
+            <a:ext cx="5337522" cy="2712760"/>
           </a:xfrm>
         </p:spPr>
         <p:txBody>
@@ -2115,8 +2115,8 @@
         </p:nvSpPr>
         <p:spPr>
           <a:xfrm>
-            <a:off x="838200" y="365125"/>
-            <a:ext cx="10515600" cy="1325563"/>
+            <a:off x="578451" y="170427"/>
+            <a:ext cx="7256927" cy="618726"/>
           </a:xfrm>
           <a:prstGeom prst="rect">
             <a:avLst/>
@@ -2148,8 +2148,8 @@
         </p:nvSpPr>
         <p:spPr>
           <a:xfrm>
-            <a:off x="838200" y="1825625"/>
-            <a:ext cx="10515600" cy="4351338"/>
+            <a:off x="578451" y="852137"/>
+            <a:ext cx="7256927" cy="2031050"/>
           </a:xfrm>
           <a:prstGeom prst="rect">
             <a:avLst/>
@@ -2214,8 +2214,8 @@
         </p:nvSpPr>
         <p:spPr>
           <a:xfrm>
-            <a:off x="838200" y="6356350"/>
-            <a:ext cx="2743200" cy="365125"/>
+            <a:off x="578451" y="2966919"/>
+            <a:ext cx="1893111" cy="170427"/>
           </a:xfrm>
           <a:prstGeom prst="rect">
             <a:avLst/>
@@ -2225,7 +2225,7 @@
           <a:bodyPr vert="horz" lIns="91440" tIns="45720" rIns="91440" bIns="45720" rtlCol="0" anchor="ctr"/>
           <a:lstStyle>
             <a:lvl1pPr algn="l">
-              <a:defRPr sz="1200">
+              <a:defRPr sz="560">
                 <a:solidFill>
                   <a:schemeClr val="tx1">
                     <a:tint val="75000"/>
@@ -2254,8 +2254,8 @@
         </p:nvSpPr>
         <p:spPr>
           <a:xfrm>
-            <a:off x="4038600" y="6356350"/>
-            <a:ext cx="4114800" cy="365125"/>
+            <a:off x="2787081" y="2966919"/>
+            <a:ext cx="2839667" cy="170427"/>
           </a:xfrm>
           <a:prstGeom prst="rect">
             <a:avLst/>
@@ -2265,7 +2265,7 @@
           <a:bodyPr vert="horz" lIns="91440" tIns="45720" rIns="91440" bIns="45720" rtlCol="0" anchor="ctr"/>
           <a:lstStyle>
             <a:lvl1pPr algn="ctr">
-              <a:defRPr sz="1200">
+              <a:defRPr sz="560">
                 <a:solidFill>
                   <a:schemeClr val="tx1">
                     <a:tint val="75000"/>
@@ -2291,8 +2291,8 @@
         </p:nvSpPr>
         <p:spPr>
           <a:xfrm>
-            <a:off x="8610600" y="6356350"/>
-            <a:ext cx="2743200" cy="365125"/>
+            <a:off x="5942266" y="2966919"/>
+            <a:ext cx="1893111" cy="170427"/>
           </a:xfrm>
           <a:prstGeom prst="rect">
             <a:avLst/>
@@ -2302,7 +2302,7 @@
           <a:bodyPr vert="horz" lIns="91440" tIns="45720" rIns="91440" bIns="45720" rtlCol="0" anchor="ctr"/>
           <a:lstStyle>
             <a:lvl1pPr algn="r">
-              <a:defRPr sz="1200">
+              <a:defRPr sz="560">
                 <a:solidFill>
                   <a:schemeClr val="tx1">
                     <a:tint val="75000"/>
@@ -2336,7 +2336,7 @@
   </p:sldLayoutIdLst>
   <p:txStyles>
     <p:titleStyle>
-      <a:lvl1pPr algn="l" defTabSz="914400" rtl="0" eaLnBrk="1" latinLnBrk="0" hangingPunct="1">
+      <a:lvl1pPr algn="l" defTabSz="426720" rtl="0" eaLnBrk="1" latinLnBrk="0" hangingPunct="1">
         <a:lnSpc>
           <a:spcPct val="90000"/>
         </a:lnSpc>
@@ -2344,7 +2344,7 @@
           <a:spcPct val="0"/>
         </a:spcBef>
         <a:buNone/>
-        <a:defRPr sz="4400" kern="1200">
+        <a:defRPr sz="2055" kern="1200">
           <a:solidFill>
             <a:schemeClr val="tx1"/>
           </a:solidFill>
@@ -2355,16 +2355,16 @@
       </a:lvl1pPr>
     </p:titleStyle>
     <p:bodyStyle>
-      <a:lvl1pPr marL="228600" indent="-228600" algn="l" defTabSz="914400" rtl="0" eaLnBrk="1" latinLnBrk="0" hangingPunct="1">
+      <a:lvl1pPr marL="106680" indent="-104140" algn="l" defTabSz="426720" rtl="0" eaLnBrk="1" latinLnBrk="0" hangingPunct="1">
         <a:lnSpc>
           <a:spcPct val="90000"/>
         </a:lnSpc>
         <a:spcBef>
-          <a:spcPts val="1000"/>
+          <a:spcPts val="465"/>
         </a:spcBef>
         <a:buFont typeface="Arial" panose="020B0604020202020204" pitchFamily="34" charset="0"/>
         <a:buChar char="•"/>
-        <a:defRPr sz="2800" kern="1200">
+        <a:defRPr sz="1305" kern="1200">
           <a:solidFill>
             <a:schemeClr val="tx1"/>
           </a:solidFill>
@@ -2373,16 +2373,16 @@
           <a:cs typeface="+mn-cs"/>
         </a:defRPr>
       </a:lvl1pPr>
-      <a:lvl2pPr marL="685800" indent="-228600" algn="l" defTabSz="914400" rtl="0" eaLnBrk="1" latinLnBrk="0" hangingPunct="1">
+      <a:lvl2pPr marL="320040" indent="-104140" algn="l" defTabSz="426720" rtl="0" eaLnBrk="1" latinLnBrk="0" hangingPunct="1">
         <a:lnSpc>
           <a:spcPct val="90000"/>
         </a:lnSpc>
         <a:spcBef>
-          <a:spcPts val="500"/>
+          <a:spcPts val="230"/>
         </a:spcBef>
         <a:buFont typeface="Arial" panose="020B0604020202020204" pitchFamily="34" charset="0"/>
         <a:buChar char="•"/>
-        <a:defRPr sz="2400" kern="1200">
+        <a:defRPr sz="1120" kern="1200">
           <a:solidFill>
             <a:schemeClr val="tx1"/>
           </a:solidFill>
@@ -2391,16 +2391,16 @@
           <a:cs typeface="+mn-cs"/>
         </a:defRPr>
       </a:lvl2pPr>
-      <a:lvl3pPr marL="1143000" indent="-228600" algn="l" defTabSz="914400" rtl="0" eaLnBrk="1" latinLnBrk="0" hangingPunct="1">
+      <a:lvl3pPr marL="533400" indent="-104140" algn="l" defTabSz="426720" rtl="0" eaLnBrk="1" latinLnBrk="0" hangingPunct="1">
         <a:lnSpc>
           <a:spcPct val="90000"/>
         </a:lnSpc>
         <a:spcBef>
-          <a:spcPts val="500"/>
+          <a:spcPts val="230"/>
         </a:spcBef>
         <a:buFont typeface="Arial" panose="020B0604020202020204" pitchFamily="34" charset="0"/>
         <a:buChar char="•"/>
-        <a:defRPr sz="2000" kern="1200">
+        <a:defRPr sz="935" kern="1200">
           <a:solidFill>
             <a:schemeClr val="tx1"/>
           </a:solidFill>
@@ -2409,16 +2409,16 @@
           <a:cs typeface="+mn-cs"/>
         </a:defRPr>
       </a:lvl3pPr>
-      <a:lvl4pPr marL="1600200" indent="-228600" algn="l" defTabSz="914400" rtl="0" eaLnBrk="1" latinLnBrk="0" hangingPunct="1">
+      <a:lvl4pPr marL="747395" indent="-104140" algn="l" defTabSz="426720" rtl="0" eaLnBrk="1" latinLnBrk="0" hangingPunct="1">
         <a:lnSpc>
           <a:spcPct val="90000"/>
         </a:lnSpc>
         <a:spcBef>
-          <a:spcPts val="500"/>
+          <a:spcPts val="230"/>
         </a:spcBef>
         <a:buFont typeface="Arial" panose="020B0604020202020204" pitchFamily="34" charset="0"/>
         <a:buChar char="•"/>
-        <a:defRPr sz="1800" kern="1200">
+        <a:defRPr sz="840" kern="1200">
           <a:solidFill>
             <a:schemeClr val="tx1"/>
           </a:solidFill>
@@ -2427,16 +2427,16 @@
           <a:cs typeface="+mn-cs"/>
         </a:defRPr>
       </a:lvl4pPr>
-      <a:lvl5pPr marL="2057400" indent="-228600" algn="l" defTabSz="914400" rtl="0" eaLnBrk="1" latinLnBrk="0" hangingPunct="1">
+      <a:lvl5pPr marL="960120" indent="-104140" algn="l" defTabSz="426720" rtl="0" eaLnBrk="1" latinLnBrk="0" hangingPunct="1">
         <a:lnSpc>
           <a:spcPct val="90000"/>
         </a:lnSpc>
         <a:spcBef>
-          <a:spcPts val="500"/>
+          <a:spcPts val="230"/>
         </a:spcBef>
         <a:buFont typeface="Arial" panose="020B0604020202020204" pitchFamily="34" charset="0"/>
         <a:buChar char="•"/>
-        <a:defRPr sz="1800" kern="1200">
+        <a:defRPr sz="840" kern="1200">
           <a:solidFill>
             <a:schemeClr val="tx1"/>
           </a:solidFill>
@@ -2445,16 +2445,16 @@
           <a:cs typeface="+mn-cs"/>
         </a:defRPr>
       </a:lvl5pPr>
-      <a:lvl6pPr marL="2514600" indent="-228600" algn="l" defTabSz="914400" rtl="0" eaLnBrk="1" latinLnBrk="0" hangingPunct="1">
+      <a:lvl6pPr marL="1173480" indent="-104140" algn="l" defTabSz="426720" rtl="0" eaLnBrk="1" latinLnBrk="0" hangingPunct="1">
         <a:lnSpc>
           <a:spcPct val="90000"/>
         </a:lnSpc>
         <a:spcBef>
-          <a:spcPts val="500"/>
+          <a:spcPts val="230"/>
         </a:spcBef>
         <a:buFont typeface="Arial" panose="020B0604020202020204" pitchFamily="34" charset="0"/>
         <a:buChar char="•"/>
-        <a:defRPr sz="1800" kern="1200">
+        <a:defRPr sz="840" kern="1200">
           <a:solidFill>
             <a:schemeClr val="tx1"/>
           </a:solidFill>
@@ -2463,16 +2463,16 @@
           <a:cs typeface="+mn-cs"/>
         </a:defRPr>
       </a:lvl6pPr>
-      <a:lvl7pPr marL="2971800" indent="-228600" algn="l" defTabSz="914400" rtl="0" eaLnBrk="1" latinLnBrk="0" hangingPunct="1">
+      <a:lvl7pPr marL="1387475" indent="-104140" algn="l" defTabSz="426720" rtl="0" eaLnBrk="1" latinLnBrk="0" hangingPunct="1">
         <a:lnSpc>
           <a:spcPct val="90000"/>
         </a:lnSpc>
         <a:spcBef>
-          <a:spcPts val="500"/>
+          <a:spcPts val="230"/>
         </a:spcBef>
         <a:buFont typeface="Arial" panose="020B0604020202020204" pitchFamily="34" charset="0"/>
         <a:buChar char="•"/>
-        <a:defRPr sz="1800" kern="1200">
+        <a:defRPr sz="840" kern="1200">
           <a:solidFill>
             <a:schemeClr val="tx1"/>
           </a:solidFill>
@@ -2481,16 +2481,16 @@
           <a:cs typeface="+mn-cs"/>
         </a:defRPr>
       </a:lvl7pPr>
-      <a:lvl8pPr marL="3429000" indent="-228600" algn="l" defTabSz="914400" rtl="0" eaLnBrk="1" latinLnBrk="0" hangingPunct="1">
+      <a:lvl8pPr marL="1600200" indent="-104140" algn="l" defTabSz="426720" rtl="0" eaLnBrk="1" latinLnBrk="0" hangingPunct="1">
         <a:lnSpc>
           <a:spcPct val="90000"/>
         </a:lnSpc>
         <a:spcBef>
-          <a:spcPts val="500"/>
+          <a:spcPts val="230"/>
         </a:spcBef>
         <a:buFont typeface="Arial" panose="020B0604020202020204" pitchFamily="34" charset="0"/>
         <a:buChar char="•"/>
-        <a:defRPr sz="1800" kern="1200">
+        <a:defRPr sz="840" kern="1200">
           <a:solidFill>
             <a:schemeClr val="tx1"/>
           </a:solidFill>
@@ -2499,16 +2499,16 @@
           <a:cs typeface="+mn-cs"/>
         </a:defRPr>
       </a:lvl8pPr>
-      <a:lvl9pPr marL="3886200" indent="-228600" algn="l" defTabSz="914400" rtl="0" eaLnBrk="1" latinLnBrk="0" hangingPunct="1">
+      <a:lvl9pPr marL="1813560" indent="-104140" algn="l" defTabSz="426720" rtl="0" eaLnBrk="1" latinLnBrk="0" hangingPunct="1">
         <a:lnSpc>
           <a:spcPct val="90000"/>
         </a:lnSpc>
         <a:spcBef>
-          <a:spcPts val="500"/>
+          <a:spcPts val="230"/>
         </a:spcBef>
         <a:buFont typeface="Arial" panose="020B0604020202020204" pitchFamily="34" charset="0"/>
         <a:buChar char="•"/>
-        <a:defRPr sz="1800" kern="1200">
+        <a:defRPr sz="840" kern="1200">
           <a:solidFill>
             <a:schemeClr val="tx1"/>
           </a:solidFill>
@@ -2522,8 +2522,8 @@
       <a:defPPr>
         <a:defRPr lang="en-US"/>
       </a:defPPr>
-      <a:lvl1pPr marL="0" algn="l" defTabSz="914400" rtl="0" eaLnBrk="1" latinLnBrk="0" hangingPunct="1">
-        <a:defRPr sz="1800" kern="1200">
+      <a:lvl1pPr marL="0" algn="l" defTabSz="426720" rtl="0" eaLnBrk="1" latinLnBrk="0" hangingPunct="1">
+        <a:defRPr sz="840" kern="1200">
           <a:solidFill>
             <a:schemeClr val="tx1"/>
           </a:solidFill>
@@ -2532,8 +2532,8 @@
           <a:cs typeface="+mn-cs"/>
         </a:defRPr>
       </a:lvl1pPr>
-      <a:lvl2pPr marL="457200" algn="l" defTabSz="914400" rtl="0" eaLnBrk="1" latinLnBrk="0" hangingPunct="1">
-        <a:defRPr sz="1800" kern="1200">
+      <a:lvl2pPr marL="213360" algn="l" defTabSz="426720" rtl="0" eaLnBrk="1" latinLnBrk="0" hangingPunct="1">
+        <a:defRPr sz="840" kern="1200">
           <a:solidFill>
             <a:schemeClr val="tx1"/>
           </a:solidFill>
@@ -2542,8 +2542,8 @@
           <a:cs typeface="+mn-cs"/>
         </a:defRPr>
       </a:lvl2pPr>
-      <a:lvl3pPr marL="914400" algn="l" defTabSz="914400" rtl="0" eaLnBrk="1" latinLnBrk="0" hangingPunct="1">
-        <a:defRPr sz="1800" kern="1200">
+      <a:lvl3pPr marL="426720" algn="l" defTabSz="426720" rtl="0" eaLnBrk="1" latinLnBrk="0" hangingPunct="1">
+        <a:defRPr sz="840" kern="1200">
           <a:solidFill>
             <a:schemeClr val="tx1"/>
           </a:solidFill>
@@ -2552,8 +2552,8 @@
           <a:cs typeface="+mn-cs"/>
         </a:defRPr>
       </a:lvl3pPr>
-      <a:lvl4pPr marL="1371600" algn="l" defTabSz="914400" rtl="0" eaLnBrk="1" latinLnBrk="0" hangingPunct="1">
-        <a:defRPr sz="1800" kern="1200">
+      <a:lvl4pPr marL="640080" algn="l" defTabSz="426720" rtl="0" eaLnBrk="1" latinLnBrk="0" hangingPunct="1">
+        <a:defRPr sz="840" kern="1200">
           <a:solidFill>
             <a:schemeClr val="tx1"/>
           </a:solidFill>
@@ -2562,8 +2562,8 @@
           <a:cs typeface="+mn-cs"/>
         </a:defRPr>
       </a:lvl4pPr>
-      <a:lvl5pPr marL="1828800" algn="l" defTabSz="914400" rtl="0" eaLnBrk="1" latinLnBrk="0" hangingPunct="1">
-        <a:defRPr sz="1800" kern="1200">
+      <a:lvl5pPr marL="853440" algn="l" defTabSz="426720" rtl="0" eaLnBrk="1" latinLnBrk="0" hangingPunct="1">
+        <a:defRPr sz="840" kern="1200">
           <a:solidFill>
             <a:schemeClr val="tx1"/>
           </a:solidFill>
@@ -2572,8 +2572,8 @@
           <a:cs typeface="+mn-cs"/>
         </a:defRPr>
       </a:lvl5pPr>
-      <a:lvl6pPr marL="2286000" algn="l" defTabSz="914400" rtl="0" eaLnBrk="1" latinLnBrk="0" hangingPunct="1">
-        <a:defRPr sz="1800" kern="1200">
+      <a:lvl6pPr marL="1067435" algn="l" defTabSz="426720" rtl="0" eaLnBrk="1" latinLnBrk="0" hangingPunct="1">
+        <a:defRPr sz="840" kern="1200">
           <a:solidFill>
             <a:schemeClr val="tx1"/>
           </a:solidFill>
@@ -2582,8 +2582,8 @@
           <a:cs typeface="+mn-cs"/>
         </a:defRPr>
       </a:lvl6pPr>
-      <a:lvl7pPr marL="2743200" algn="l" defTabSz="914400" rtl="0" eaLnBrk="1" latinLnBrk="0" hangingPunct="1">
-        <a:defRPr sz="1800" kern="1200">
+      <a:lvl7pPr marL="1280160" algn="l" defTabSz="426720" rtl="0" eaLnBrk="1" latinLnBrk="0" hangingPunct="1">
+        <a:defRPr sz="840" kern="1200">
           <a:solidFill>
             <a:schemeClr val="tx1"/>
           </a:solidFill>
@@ -2592,8 +2592,8 @@
           <a:cs typeface="+mn-cs"/>
         </a:defRPr>
       </a:lvl7pPr>
-      <a:lvl8pPr marL="3200400" algn="l" defTabSz="914400" rtl="0" eaLnBrk="1" latinLnBrk="0" hangingPunct="1">
-        <a:defRPr sz="1800" kern="1200">
+      <a:lvl8pPr marL="1493520" algn="l" defTabSz="426720" rtl="0" eaLnBrk="1" latinLnBrk="0" hangingPunct="1">
+        <a:defRPr sz="840" kern="1200">
           <a:solidFill>
             <a:schemeClr val="tx1"/>
           </a:solidFill>
@@ -2602,8 +2602,8 @@
           <a:cs typeface="+mn-cs"/>
         </a:defRPr>
       </a:lvl8pPr>
-      <a:lvl9pPr marL="3657600" algn="l" defTabSz="914400" rtl="0" eaLnBrk="1" latinLnBrk="0" hangingPunct="1">
-        <a:defRPr sz="1800" kern="1200">
+      <a:lvl9pPr marL="1707515" algn="l" defTabSz="426720" rtl="0" eaLnBrk="1" latinLnBrk="0" hangingPunct="1">
+        <a:defRPr sz="840" kern="1200">
           <a:solidFill>
             <a:schemeClr val="tx1"/>
           </a:solidFill>
@@ -2635,8 +2635,8 @@
         </p:nvSpPr>
         <p:spPr>
           <a:xfrm>
-            <a:off x="5774690" y="1369695"/>
-            <a:ext cx="1393190" cy="687070"/>
+            <a:off x="1361333" y="1340444"/>
+            <a:ext cx="962389" cy="474615"/>
           </a:xfrm>
           <a:prstGeom prst="roundRect">
             <a:avLst/>
@@ -2664,14 +2664,14 @@
           <a:p>
             <a:pPr algn="ctr"/>
             <a:r>
-              <a:rPr lang="en-US">
+              <a:rPr lang="en-US" sz="1245">
                 <a:solidFill>
                   <a:srgbClr val="FF0000"/>
                 </a:solidFill>
               </a:rPr>
               <a:t>ADC/FFT</a:t>
             </a:r>
-            <a:endParaRPr lang="en-US">
+            <a:endParaRPr lang="en-US" sz="1245">
               <a:solidFill>
                 <a:srgbClr val="FF0000"/>
               </a:solidFill>
@@ -2687,8 +2687,8 @@
         </p:nvSpPr>
         <p:spPr>
           <a:xfrm>
-            <a:off x="4038600" y="1127760"/>
-            <a:ext cx="1171575" cy="1171575"/>
+            <a:off x="162075" y="1173320"/>
+            <a:ext cx="998797" cy="809302"/>
           </a:xfrm>
           <a:prstGeom prst="ellipse">
             <a:avLst/>
@@ -2716,14 +2716,14 @@
           <a:p>
             <a:pPr algn="ctr"/>
             <a:r>
-              <a:rPr lang="en-US">
+              <a:rPr lang="en-US" sz="1245">
                 <a:solidFill>
                   <a:srgbClr val="0070C0"/>
                 </a:solidFill>
               </a:rPr>
               <a:t>Raw</a:t>
             </a:r>
-            <a:endParaRPr lang="en-US">
+            <a:endParaRPr lang="en-US" sz="1245">
               <a:solidFill>
                 <a:srgbClr val="0070C0"/>
               </a:solidFill>
@@ -2732,14 +2732,14 @@
           <a:p>
             <a:pPr algn="ctr"/>
             <a:r>
-              <a:rPr lang="en-US">
+              <a:rPr lang="en-US" sz="1245">
                 <a:solidFill>
                   <a:srgbClr val="0070C0"/>
                 </a:solidFill>
               </a:rPr>
               <a:t>Data</a:t>
             </a:r>
-            <a:endParaRPr lang="en-US">
+            <a:endParaRPr lang="en-US" sz="1245">
               <a:solidFill>
                 <a:srgbClr val="0070C0"/>
               </a:solidFill>
@@ -2747,6 +2747,1028 @@
           </a:p>
         </p:txBody>
       </p:sp>
+      <p:cxnSp>
+        <p:nvCxnSpPr>
+          <p:cNvPr id="6" name="Straight Arrow Connector 5"/>
+          <p:cNvCxnSpPr>
+            <a:stCxn id="5" idx="6"/>
+            <a:endCxn id="4" idx="1"/>
+          </p:cNvCxnSpPr>
+          <p:nvPr/>
+        </p:nvCxnSpPr>
+        <p:spPr>
+          <a:xfrm>
+            <a:off x="1160872" y="1578190"/>
+            <a:ext cx="200679" cy="0"/>
+          </a:xfrm>
+          <a:prstGeom prst="straightConnector1">
+            <a:avLst/>
+          </a:prstGeom>
+          <a:ln w="19050">
+            <a:tailEnd type="arrow"/>
+          </a:ln>
+        </p:spPr>
+        <p:style>
+          <a:lnRef idx="1">
+            <a:schemeClr val="accent1"/>
+          </a:lnRef>
+          <a:fillRef idx="0">
+            <a:schemeClr val="accent1"/>
+          </a:fillRef>
+          <a:effectRef idx="0">
+            <a:schemeClr val="accent1"/>
+          </a:effectRef>
+          <a:fontRef idx="minor">
+            <a:schemeClr val="tx1"/>
+          </a:fontRef>
+        </p:style>
+      </p:cxnSp>
+      <p:sp>
+        <p:nvSpPr>
+          <p:cNvPr id="7" name="Diamond 6"/>
+          <p:cNvSpPr/>
+          <p:nvPr/>
+        </p:nvSpPr>
+        <p:spPr>
+          <a:xfrm>
+            <a:off x="1266586" y="2099740"/>
+            <a:ext cx="1151446" cy="415398"/>
+          </a:xfrm>
+          <a:prstGeom prst="diamond">
+            <a:avLst/>
+          </a:prstGeom>
+          <a:noFill/>
+        </p:spPr>
+        <p:style>
+          <a:lnRef idx="2">
+            <a:schemeClr val="accent1">
+              <a:shade val="50000"/>
+            </a:schemeClr>
+          </a:lnRef>
+          <a:fillRef idx="1">
+            <a:schemeClr val="accent1"/>
+          </a:fillRef>
+          <a:effectRef idx="0">
+            <a:schemeClr val="accent1"/>
+          </a:effectRef>
+          <a:fontRef idx="minor">
+            <a:schemeClr val="lt1"/>
+          </a:fontRef>
+        </p:style>
+        <p:txBody>
+          <a:bodyPr rtlCol="0" anchor="ctr"/>
+          <a:p>
+            <a:pPr algn="ctr"/>
+            <a:r>
+              <a:rPr lang="en-US" sz="1105">
+                <a:solidFill>
+                  <a:srgbClr val="853A4F"/>
+                </a:solidFill>
+              </a:rPr>
+              <a:t>Vis2</a:t>
+            </a:r>
+            <a:endParaRPr lang="en-US" sz="1105">
+              <a:solidFill>
+                <a:srgbClr val="853A4F"/>
+              </a:solidFill>
+            </a:endParaRPr>
+          </a:p>
+        </p:txBody>
+      </p:sp>
+      <p:cxnSp>
+        <p:nvCxnSpPr>
+          <p:cNvPr id="8" name="Straight Arrow Connector 7"/>
+          <p:cNvCxnSpPr>
+            <a:stCxn id="4" idx="2"/>
+            <a:endCxn id="7" idx="0"/>
+          </p:cNvCxnSpPr>
+          <p:nvPr/>
+        </p:nvCxnSpPr>
+        <p:spPr>
+          <a:xfrm flipH="1">
+            <a:off x="1842528" y="1815607"/>
+            <a:ext cx="548" cy="284021"/>
+          </a:xfrm>
+          <a:prstGeom prst="straightConnector1">
+            <a:avLst/>
+          </a:prstGeom>
+          <a:ln w="19050">
+            <a:solidFill>
+              <a:srgbClr val="853A4F"/>
+            </a:solidFill>
+            <a:tailEnd type="arrow"/>
+          </a:ln>
+        </p:spPr>
+        <p:style>
+          <a:lnRef idx="1">
+            <a:schemeClr val="accent1"/>
+          </a:lnRef>
+          <a:fillRef idx="0">
+            <a:schemeClr val="accent1"/>
+          </a:fillRef>
+          <a:effectRef idx="0">
+            <a:schemeClr val="accent1"/>
+          </a:effectRef>
+          <a:fontRef idx="minor">
+            <a:schemeClr val="tx1"/>
+          </a:fontRef>
+        </p:style>
+      </p:cxnSp>
+      <p:sp>
+        <p:nvSpPr>
+          <p:cNvPr id="9" name="Diamond 8"/>
+          <p:cNvSpPr/>
+          <p:nvPr/>
+        </p:nvSpPr>
+        <p:spPr>
+          <a:xfrm>
+            <a:off x="1267024" y="656156"/>
+            <a:ext cx="1151446" cy="415398"/>
+          </a:xfrm>
+          <a:prstGeom prst="diamond">
+            <a:avLst/>
+          </a:prstGeom>
+          <a:noFill/>
+        </p:spPr>
+        <p:style>
+          <a:lnRef idx="2">
+            <a:schemeClr val="accent1">
+              <a:shade val="50000"/>
+            </a:schemeClr>
+          </a:lnRef>
+          <a:fillRef idx="1">
+            <a:schemeClr val="accent1"/>
+          </a:fillRef>
+          <a:effectRef idx="0">
+            <a:schemeClr val="accent1"/>
+          </a:effectRef>
+          <a:fontRef idx="minor">
+            <a:schemeClr val="lt1"/>
+          </a:fontRef>
+        </p:style>
+        <p:txBody>
+          <a:bodyPr rtlCol="0" anchor="ctr"/>
+          <a:p>
+            <a:pPr algn="ctr"/>
+            <a:r>
+              <a:rPr lang="en-US" sz="1105">
+                <a:solidFill>
+                  <a:srgbClr val="853A4F"/>
+                </a:solidFill>
+              </a:rPr>
+              <a:t>Vis1</a:t>
+            </a:r>
+            <a:endParaRPr lang="en-US" sz="1105">
+              <a:solidFill>
+                <a:srgbClr val="853A4F"/>
+              </a:solidFill>
+            </a:endParaRPr>
+          </a:p>
+        </p:txBody>
+      </p:sp>
+      <p:cxnSp>
+        <p:nvCxnSpPr>
+          <p:cNvPr id="10" name="Straight Arrow Connector 9"/>
+          <p:cNvCxnSpPr>
+            <a:stCxn id="4" idx="0"/>
+            <a:endCxn id="9" idx="2"/>
+          </p:cNvCxnSpPr>
+          <p:nvPr/>
+        </p:nvCxnSpPr>
+        <p:spPr>
+          <a:xfrm flipV="1">
+            <a:off x="1843076" y="1071775"/>
+            <a:ext cx="0" cy="268669"/>
+          </a:xfrm>
+          <a:prstGeom prst="straightConnector1">
+            <a:avLst/>
+          </a:prstGeom>
+          <a:ln w="19050">
+            <a:solidFill>
+              <a:srgbClr val="853A4F"/>
+            </a:solidFill>
+            <a:tailEnd type="arrow"/>
+          </a:ln>
+        </p:spPr>
+        <p:style>
+          <a:lnRef idx="1">
+            <a:schemeClr val="accent1"/>
+          </a:lnRef>
+          <a:fillRef idx="0">
+            <a:schemeClr val="accent1"/>
+          </a:fillRef>
+          <a:effectRef idx="0">
+            <a:schemeClr val="accent1"/>
+          </a:effectRef>
+          <a:fontRef idx="minor">
+            <a:schemeClr val="tx1"/>
+          </a:fontRef>
+        </p:style>
+      </p:cxnSp>
+      <p:sp>
+        <p:nvSpPr>
+          <p:cNvPr id="11" name="Rounded Rectangle 10"/>
+          <p:cNvSpPr/>
+          <p:nvPr/>
+        </p:nvSpPr>
+        <p:spPr>
+          <a:xfrm>
+            <a:off x="3993318" y="1340883"/>
+            <a:ext cx="962389" cy="474615"/>
+          </a:xfrm>
+          <a:prstGeom prst="roundRect">
+            <a:avLst/>
+          </a:prstGeom>
+          <a:noFill/>
+        </p:spPr>
+        <p:style>
+          <a:lnRef idx="2">
+            <a:schemeClr val="accent1">
+              <a:shade val="50000"/>
+            </a:schemeClr>
+          </a:lnRef>
+          <a:fillRef idx="1">
+            <a:schemeClr val="accent1"/>
+          </a:fillRef>
+          <a:effectRef idx="0">
+            <a:schemeClr val="accent1"/>
+          </a:effectRef>
+          <a:fontRef idx="minor">
+            <a:schemeClr val="lt1"/>
+          </a:fontRef>
+        </p:style>
+        <p:txBody>
+          <a:bodyPr rtlCol="0" anchor="ctr"/>
+          <a:p>
+            <a:pPr algn="ctr"/>
+            <a:r>
+              <a:rPr lang="en-US" sz="1245">
+                <a:solidFill>
+                  <a:srgbClr val="00B050"/>
+                </a:solidFill>
+              </a:rPr>
+              <a:t>Sig</a:t>
+            </a:r>
+            <a:endParaRPr lang="en-US" sz="1245">
+              <a:solidFill>
+                <a:srgbClr val="00B050"/>
+              </a:solidFill>
+            </a:endParaRPr>
+          </a:p>
+        </p:txBody>
+      </p:sp>
+      <p:sp>
+        <p:nvSpPr>
+          <p:cNvPr id="14" name="Oval 13"/>
+          <p:cNvSpPr/>
+          <p:nvPr/>
+        </p:nvSpPr>
+        <p:spPr>
+          <a:xfrm>
+            <a:off x="2559655" y="1172859"/>
+            <a:ext cx="1198043" cy="809296"/>
+          </a:xfrm>
+          <a:prstGeom prst="ellipse">
+            <a:avLst/>
+          </a:prstGeom>
+          <a:noFill/>
+        </p:spPr>
+        <p:style>
+          <a:lnRef idx="2">
+            <a:schemeClr val="accent1">
+              <a:shade val="50000"/>
+            </a:schemeClr>
+          </a:lnRef>
+          <a:fillRef idx="1">
+            <a:schemeClr val="accent1"/>
+          </a:fillRef>
+          <a:effectRef idx="0">
+            <a:schemeClr val="accent1"/>
+          </a:effectRef>
+          <a:fontRef idx="minor">
+            <a:schemeClr val="lt1"/>
+          </a:fontRef>
+        </p:style>
+        <p:txBody>
+          <a:bodyPr rtlCol="0" anchor="ctr"/>
+          <a:p>
+            <a:pPr algn="ctr"/>
+            <a:r>
+              <a:rPr lang="en-US" sz="970">
+                <a:solidFill>
+                  <a:srgbClr val="FF0000"/>
+                </a:solidFill>
+              </a:rPr>
+              <a:t>Transformed</a:t>
+            </a:r>
+            <a:endParaRPr lang="en-US" sz="970">
+              <a:solidFill>
+                <a:srgbClr val="FF0000"/>
+              </a:solidFill>
+            </a:endParaRPr>
+          </a:p>
+          <a:p>
+            <a:pPr algn="ctr"/>
+            <a:r>
+              <a:rPr lang="en-US" sz="970">
+                <a:solidFill>
+                  <a:srgbClr val="FF0000"/>
+                </a:solidFill>
+              </a:rPr>
+              <a:t>Data</a:t>
+            </a:r>
+            <a:endParaRPr lang="en-US" sz="970">
+              <a:solidFill>
+                <a:srgbClr val="FF0000"/>
+              </a:solidFill>
+            </a:endParaRPr>
+          </a:p>
+        </p:txBody>
+      </p:sp>
+      <p:cxnSp>
+        <p:nvCxnSpPr>
+          <p:cNvPr id="15" name="Straight Arrow Connector 14"/>
+          <p:cNvCxnSpPr>
+            <a:stCxn id="4" idx="3"/>
+            <a:endCxn id="14" idx="2"/>
+          </p:cNvCxnSpPr>
+          <p:nvPr/>
+        </p:nvCxnSpPr>
+        <p:spPr>
+          <a:xfrm flipV="1">
+            <a:off x="2323723" y="1577751"/>
+            <a:ext cx="235771" cy="548"/>
+          </a:xfrm>
+          <a:prstGeom prst="straightConnector1">
+            <a:avLst/>
+          </a:prstGeom>
+          <a:ln w="19050">
+            <a:solidFill>
+              <a:srgbClr val="FF0000"/>
+            </a:solidFill>
+            <a:tailEnd type="arrow"/>
+          </a:ln>
+        </p:spPr>
+        <p:style>
+          <a:lnRef idx="1">
+            <a:schemeClr val="accent1"/>
+          </a:lnRef>
+          <a:fillRef idx="0">
+            <a:schemeClr val="accent1"/>
+          </a:fillRef>
+          <a:effectRef idx="0">
+            <a:schemeClr val="accent1"/>
+          </a:effectRef>
+          <a:fontRef idx="minor">
+            <a:schemeClr val="tx1"/>
+          </a:fontRef>
+        </p:style>
+      </p:cxnSp>
+      <p:cxnSp>
+        <p:nvCxnSpPr>
+          <p:cNvPr id="16" name="Straight Arrow Connector 15"/>
+          <p:cNvCxnSpPr>
+            <a:stCxn id="14" idx="6"/>
+            <a:endCxn id="11" idx="1"/>
+          </p:cNvCxnSpPr>
+          <p:nvPr/>
+        </p:nvCxnSpPr>
+        <p:spPr>
+          <a:xfrm>
+            <a:off x="3757656" y="1577751"/>
+            <a:ext cx="235771" cy="548"/>
+          </a:xfrm>
+          <a:prstGeom prst="straightConnector1">
+            <a:avLst/>
+          </a:prstGeom>
+          <a:ln w="19050">
+            <a:solidFill>
+              <a:srgbClr val="FF0000"/>
+            </a:solidFill>
+            <a:tailEnd type="arrow"/>
+          </a:ln>
+        </p:spPr>
+        <p:style>
+          <a:lnRef idx="1">
+            <a:schemeClr val="accent1"/>
+          </a:lnRef>
+          <a:fillRef idx="0">
+            <a:schemeClr val="accent1"/>
+          </a:fillRef>
+          <a:effectRef idx="0">
+            <a:schemeClr val="accent1"/>
+          </a:effectRef>
+          <a:fontRef idx="minor">
+            <a:schemeClr val="tx1"/>
+          </a:fontRef>
+        </p:style>
+      </p:cxnSp>
+      <p:sp>
+        <p:nvSpPr>
+          <p:cNvPr id="17" name="Diamond 16"/>
+          <p:cNvSpPr/>
+          <p:nvPr/>
+        </p:nvSpPr>
+        <p:spPr>
+          <a:xfrm>
+            <a:off x="3898571" y="656156"/>
+            <a:ext cx="1151446" cy="415398"/>
+          </a:xfrm>
+          <a:prstGeom prst="diamond">
+            <a:avLst/>
+          </a:prstGeom>
+          <a:noFill/>
+        </p:spPr>
+        <p:style>
+          <a:lnRef idx="2">
+            <a:schemeClr val="accent1">
+              <a:shade val="50000"/>
+            </a:schemeClr>
+          </a:lnRef>
+          <a:fillRef idx="1">
+            <a:schemeClr val="accent1"/>
+          </a:fillRef>
+          <a:effectRef idx="0">
+            <a:schemeClr val="accent1"/>
+          </a:effectRef>
+          <a:fontRef idx="minor">
+            <a:schemeClr val="lt1"/>
+          </a:fontRef>
+        </p:style>
+        <p:txBody>
+          <a:bodyPr rtlCol="0" anchor="ctr"/>
+          <a:p>
+            <a:pPr algn="ctr"/>
+            <a:r>
+              <a:rPr lang="en-US" sz="1105">
+                <a:solidFill>
+                  <a:schemeClr val="accent6">
+                    <a:lumMod val="75000"/>
+                  </a:schemeClr>
+                </a:solidFill>
+              </a:rPr>
+              <a:t>Vis3</a:t>
+            </a:r>
+            <a:endParaRPr lang="en-US" sz="1105">
+              <a:solidFill>
+                <a:schemeClr val="accent6">
+                  <a:lumMod val="75000"/>
+                </a:schemeClr>
+              </a:solidFill>
+            </a:endParaRPr>
+          </a:p>
+        </p:txBody>
+      </p:sp>
+      <p:cxnSp>
+        <p:nvCxnSpPr>
+          <p:cNvPr id="18" name="Straight Arrow Connector 17"/>
+          <p:cNvCxnSpPr>
+            <a:stCxn id="11" idx="0"/>
+            <a:endCxn id="17" idx="2"/>
+          </p:cNvCxnSpPr>
+          <p:nvPr/>
+        </p:nvCxnSpPr>
+        <p:spPr>
+          <a:xfrm flipH="1" flipV="1">
+            <a:off x="4474513" y="1072214"/>
+            <a:ext cx="548" cy="268669"/>
+          </a:xfrm>
+          <a:prstGeom prst="straightConnector1">
+            <a:avLst/>
+          </a:prstGeom>
+          <a:ln w="19050">
+            <a:solidFill>
+              <a:schemeClr val="accent6">
+                <a:lumMod val="75000"/>
+              </a:schemeClr>
+            </a:solidFill>
+            <a:tailEnd type="arrow"/>
+          </a:ln>
+        </p:spPr>
+        <p:style>
+          <a:lnRef idx="1">
+            <a:schemeClr val="accent1"/>
+          </a:lnRef>
+          <a:fillRef idx="0">
+            <a:schemeClr val="accent1"/>
+          </a:fillRef>
+          <a:effectRef idx="0">
+            <a:schemeClr val="accent1"/>
+          </a:effectRef>
+          <a:fontRef idx="minor">
+            <a:schemeClr val="tx1"/>
+          </a:fontRef>
+        </p:style>
+      </p:cxnSp>
+      <p:sp>
+        <p:nvSpPr>
+          <p:cNvPr id="19" name="Diamond 18"/>
+          <p:cNvSpPr/>
+          <p:nvPr/>
+        </p:nvSpPr>
+        <p:spPr>
+          <a:xfrm>
+            <a:off x="3898571" y="2099740"/>
+            <a:ext cx="1151446" cy="415398"/>
+          </a:xfrm>
+          <a:prstGeom prst="diamond">
+            <a:avLst/>
+          </a:prstGeom>
+          <a:noFill/>
+        </p:spPr>
+        <p:style>
+          <a:lnRef idx="2">
+            <a:schemeClr val="accent1">
+              <a:shade val="50000"/>
+            </a:schemeClr>
+          </a:lnRef>
+          <a:fillRef idx="1">
+            <a:schemeClr val="accent1"/>
+          </a:fillRef>
+          <a:effectRef idx="0">
+            <a:schemeClr val="accent1"/>
+          </a:effectRef>
+          <a:fontRef idx="minor">
+            <a:schemeClr val="lt1"/>
+          </a:fontRef>
+        </p:style>
+        <p:txBody>
+          <a:bodyPr rtlCol="0" anchor="ctr"/>
+          <a:p>
+            <a:pPr algn="ctr"/>
+            <a:r>
+              <a:rPr lang="en-US" sz="1105">
+                <a:solidFill>
+                  <a:schemeClr val="accent6">
+                    <a:lumMod val="75000"/>
+                  </a:schemeClr>
+                </a:solidFill>
+              </a:rPr>
+              <a:t>Vis4</a:t>
+            </a:r>
+            <a:endParaRPr lang="en-US" sz="1105">
+              <a:solidFill>
+                <a:schemeClr val="accent6">
+                  <a:lumMod val="75000"/>
+                </a:schemeClr>
+              </a:solidFill>
+            </a:endParaRPr>
+          </a:p>
+        </p:txBody>
+      </p:sp>
+      <p:cxnSp>
+        <p:nvCxnSpPr>
+          <p:cNvPr id="20" name="Straight Arrow Connector 19"/>
+          <p:cNvCxnSpPr>
+            <a:stCxn id="11" idx="2"/>
+            <a:endCxn id="19" idx="0"/>
+          </p:cNvCxnSpPr>
+          <p:nvPr/>
+        </p:nvCxnSpPr>
+        <p:spPr>
+          <a:xfrm flipH="1">
+            <a:off x="4474513" y="1815498"/>
+            <a:ext cx="548" cy="284021"/>
+          </a:xfrm>
+          <a:prstGeom prst="straightConnector1">
+            <a:avLst/>
+          </a:prstGeom>
+          <a:ln w="19050">
+            <a:solidFill>
+              <a:schemeClr val="accent6">
+                <a:lumMod val="75000"/>
+              </a:schemeClr>
+            </a:solidFill>
+            <a:tailEnd type="arrow"/>
+          </a:ln>
+        </p:spPr>
+        <p:style>
+          <a:lnRef idx="1">
+            <a:schemeClr val="accent1"/>
+          </a:lnRef>
+          <a:fillRef idx="0">
+            <a:schemeClr val="accent1"/>
+          </a:fillRef>
+          <a:effectRef idx="0">
+            <a:schemeClr val="accent1"/>
+          </a:effectRef>
+          <a:fontRef idx="minor">
+            <a:schemeClr val="tx1"/>
+          </a:fontRef>
+        </p:style>
+      </p:cxnSp>
+      <p:sp>
+        <p:nvSpPr>
+          <p:cNvPr id="21" name="Oval 20"/>
+          <p:cNvSpPr/>
+          <p:nvPr/>
+        </p:nvSpPr>
+        <p:spPr>
+          <a:xfrm>
+            <a:off x="5309945" y="1172859"/>
+            <a:ext cx="1440393" cy="809296"/>
+          </a:xfrm>
+          <a:prstGeom prst="ellipse">
+            <a:avLst/>
+          </a:prstGeom>
+          <a:noFill/>
+        </p:spPr>
+        <p:style>
+          <a:lnRef idx="2">
+            <a:schemeClr val="accent1">
+              <a:shade val="50000"/>
+            </a:schemeClr>
+          </a:lnRef>
+          <a:fillRef idx="1">
+            <a:schemeClr val="accent1"/>
+          </a:fillRef>
+          <a:effectRef idx="0">
+            <a:schemeClr val="accent1"/>
+          </a:effectRef>
+          <a:fontRef idx="minor">
+            <a:schemeClr val="lt1"/>
+          </a:fontRef>
+        </p:style>
+        <p:txBody>
+          <a:bodyPr rtlCol="0" anchor="ctr"/>
+          <a:p>
+            <a:pPr algn="ctr"/>
+            <a:r>
+              <a:rPr lang="en-US" sz="970">
+                <a:solidFill>
+                  <a:srgbClr val="00B050"/>
+                </a:solidFill>
+              </a:rPr>
+              <a:t>Filtered,</a:t>
+            </a:r>
+            <a:endParaRPr lang="en-US" sz="970">
+              <a:solidFill>
+                <a:srgbClr val="00B050"/>
+              </a:solidFill>
+            </a:endParaRPr>
+          </a:p>
+          <a:p>
+            <a:pPr algn="ctr"/>
+            <a:r>
+              <a:rPr lang="en-US" sz="970">
+                <a:solidFill>
+                  <a:srgbClr val="00B050"/>
+                </a:solidFill>
+              </a:rPr>
+              <a:t>de-noised,</a:t>
+            </a:r>
+            <a:endParaRPr lang="en-US" sz="970">
+              <a:solidFill>
+                <a:srgbClr val="00B050"/>
+              </a:solidFill>
+            </a:endParaRPr>
+          </a:p>
+          <a:p>
+            <a:pPr algn="ctr"/>
+            <a:r>
+              <a:rPr lang="en-US" sz="970">
+                <a:solidFill>
+                  <a:srgbClr val="00B050"/>
+                </a:solidFill>
+              </a:rPr>
+              <a:t>deconvoluted</a:t>
+            </a:r>
+            <a:endParaRPr lang="en-US" sz="970">
+              <a:solidFill>
+                <a:srgbClr val="00B050"/>
+              </a:solidFill>
+            </a:endParaRPr>
+          </a:p>
+          <a:p>
+            <a:pPr algn="ctr"/>
+            <a:r>
+              <a:rPr lang="en-US" sz="970">
+                <a:solidFill>
+                  <a:srgbClr val="00B050"/>
+                </a:solidFill>
+              </a:rPr>
+              <a:t>signal data</a:t>
+            </a:r>
+            <a:endParaRPr lang="en-US" sz="970">
+              <a:solidFill>
+                <a:srgbClr val="00B050"/>
+              </a:solidFill>
+            </a:endParaRPr>
+          </a:p>
+        </p:txBody>
+      </p:sp>
+      <p:cxnSp>
+        <p:nvCxnSpPr>
+          <p:cNvPr id="22" name="Straight Arrow Connector 21"/>
+          <p:cNvCxnSpPr>
+            <a:stCxn id="11" idx="3"/>
+            <a:endCxn id="21" idx="2"/>
+          </p:cNvCxnSpPr>
+          <p:nvPr/>
+        </p:nvCxnSpPr>
+        <p:spPr>
+          <a:xfrm flipV="1">
+            <a:off x="4955741" y="1577507"/>
+            <a:ext cx="354204" cy="548"/>
+          </a:xfrm>
+          <a:prstGeom prst="straightConnector1">
+            <a:avLst/>
+          </a:prstGeom>
+          <a:ln w="19050">
+            <a:solidFill>
+              <a:srgbClr val="00B050"/>
+            </a:solidFill>
+            <a:tailEnd type="arrow"/>
+          </a:ln>
+        </p:spPr>
+        <p:style>
+          <a:lnRef idx="1">
+            <a:schemeClr val="accent1"/>
+          </a:lnRef>
+          <a:fillRef idx="0">
+            <a:schemeClr val="accent1"/>
+          </a:fillRef>
+          <a:effectRef idx="0">
+            <a:schemeClr val="accent1"/>
+          </a:effectRef>
+          <a:fontRef idx="minor">
+            <a:schemeClr val="tx1"/>
+          </a:fontRef>
+        </p:style>
+      </p:cxnSp>
+      <p:sp>
+        <p:nvSpPr>
+          <p:cNvPr id="23" name="Rounded Rectangle 22"/>
+          <p:cNvSpPr/>
+          <p:nvPr/>
+        </p:nvSpPr>
+        <p:spPr>
+          <a:xfrm>
+            <a:off x="7180607" y="1340882"/>
+            <a:ext cx="962389" cy="474615"/>
+          </a:xfrm>
+          <a:prstGeom prst="roundRect">
+            <a:avLst/>
+          </a:prstGeom>
+          <a:noFill/>
+        </p:spPr>
+        <p:style>
+          <a:lnRef idx="2">
+            <a:schemeClr val="accent1">
+              <a:shade val="50000"/>
+            </a:schemeClr>
+          </a:lnRef>
+          <a:fillRef idx="1">
+            <a:schemeClr val="accent1"/>
+          </a:fillRef>
+          <a:effectRef idx="0">
+            <a:schemeClr val="accent1"/>
+          </a:effectRef>
+          <a:fontRef idx="minor">
+            <a:schemeClr val="lt1"/>
+          </a:fontRef>
+        </p:style>
+        <p:txBody>
+          <a:bodyPr rtlCol="0" anchor="ctr"/>
+          <a:p>
+            <a:pPr algn="ctr"/>
+            <a:r>
+              <a:rPr lang="en-US" sz="1245">
+                <a:solidFill>
+                  <a:schemeClr val="tx1"/>
+                </a:solidFill>
+              </a:rPr>
+              <a:t>Reco</a:t>
+            </a:r>
+            <a:endParaRPr lang="en-US" sz="1245">
+              <a:solidFill>
+                <a:schemeClr val="tx1"/>
+              </a:solidFill>
+            </a:endParaRPr>
+          </a:p>
+        </p:txBody>
+      </p:sp>
+      <p:cxnSp>
+        <p:nvCxnSpPr>
+          <p:cNvPr id="24" name="Straight Arrow Connector 23"/>
+          <p:cNvCxnSpPr>
+            <a:stCxn id="21" idx="6"/>
+            <a:endCxn id="23" idx="1"/>
+          </p:cNvCxnSpPr>
+          <p:nvPr/>
+        </p:nvCxnSpPr>
+        <p:spPr>
+          <a:xfrm>
+            <a:off x="6750339" y="1577507"/>
+            <a:ext cx="430418" cy="548"/>
+          </a:xfrm>
+          <a:prstGeom prst="straightConnector1">
+            <a:avLst/>
+          </a:prstGeom>
+          <a:ln w="19050">
+            <a:solidFill>
+              <a:srgbClr val="00B050"/>
+            </a:solidFill>
+            <a:tailEnd type="arrow"/>
+          </a:ln>
+        </p:spPr>
+        <p:style>
+          <a:lnRef idx="1">
+            <a:schemeClr val="accent1"/>
+          </a:lnRef>
+          <a:fillRef idx="0">
+            <a:schemeClr val="accent1"/>
+          </a:fillRef>
+          <a:effectRef idx="0">
+            <a:schemeClr val="accent1"/>
+          </a:effectRef>
+          <a:fontRef idx="minor">
+            <a:schemeClr val="tx1"/>
+          </a:fontRef>
+        </p:style>
+      </p:cxnSp>
+      <p:sp>
+        <p:nvSpPr>
+          <p:cNvPr id="25" name="Diamond 24"/>
+          <p:cNvSpPr/>
+          <p:nvPr/>
+        </p:nvSpPr>
+        <p:spPr>
+          <a:xfrm>
+            <a:off x="7085859" y="656156"/>
+            <a:ext cx="1151446" cy="415398"/>
+          </a:xfrm>
+          <a:prstGeom prst="diamond">
+            <a:avLst/>
+          </a:prstGeom>
+          <a:noFill/>
+        </p:spPr>
+        <p:style>
+          <a:lnRef idx="2">
+            <a:schemeClr val="accent1">
+              <a:shade val="50000"/>
+            </a:schemeClr>
+          </a:lnRef>
+          <a:fillRef idx="1">
+            <a:schemeClr val="accent1"/>
+          </a:fillRef>
+          <a:effectRef idx="0">
+            <a:schemeClr val="accent1"/>
+          </a:effectRef>
+          <a:fontRef idx="minor">
+            <a:schemeClr val="lt1"/>
+          </a:fontRef>
+        </p:style>
+        <p:txBody>
+          <a:bodyPr rtlCol="0" anchor="ctr"/>
+          <a:p>
+            <a:pPr algn="ctr"/>
+            <a:r>
+              <a:rPr lang="en-US" sz="1105">
+                <a:solidFill>
+                  <a:schemeClr val="tx1"/>
+                </a:solidFill>
+              </a:rPr>
+              <a:t>Vis5</a:t>
+            </a:r>
+            <a:endParaRPr lang="en-US" sz="1105">
+              <a:solidFill>
+                <a:schemeClr val="tx1"/>
+              </a:solidFill>
+            </a:endParaRPr>
+          </a:p>
+        </p:txBody>
+      </p:sp>
+      <p:cxnSp>
+        <p:nvCxnSpPr>
+          <p:cNvPr id="26" name="Straight Arrow Connector 25"/>
+          <p:cNvCxnSpPr>
+            <a:stCxn id="23" idx="0"/>
+            <a:endCxn id="25" idx="2"/>
+          </p:cNvCxnSpPr>
+          <p:nvPr/>
+        </p:nvCxnSpPr>
+        <p:spPr>
+          <a:xfrm flipH="1" flipV="1">
+            <a:off x="7661619" y="1071971"/>
+            <a:ext cx="548" cy="268669"/>
+          </a:xfrm>
+          <a:prstGeom prst="straightConnector1">
+            <a:avLst/>
+          </a:prstGeom>
+          <a:ln w="19050">
+            <a:solidFill>
+              <a:schemeClr val="tx1"/>
+            </a:solidFill>
+            <a:tailEnd type="arrow"/>
+          </a:ln>
+        </p:spPr>
+        <p:style>
+          <a:lnRef idx="1">
+            <a:schemeClr val="accent1"/>
+          </a:lnRef>
+          <a:fillRef idx="0">
+            <a:schemeClr val="accent1"/>
+          </a:fillRef>
+          <a:effectRef idx="0">
+            <a:schemeClr val="accent1"/>
+          </a:effectRef>
+          <a:fontRef idx="minor">
+            <a:schemeClr val="tx1"/>
+          </a:fontRef>
+        </p:style>
+      </p:cxnSp>
+      <p:sp>
+        <p:nvSpPr>
+          <p:cNvPr id="27" name="Diamond 26"/>
+          <p:cNvSpPr/>
+          <p:nvPr/>
+        </p:nvSpPr>
+        <p:spPr>
+          <a:xfrm>
+            <a:off x="7085859" y="2099291"/>
+            <a:ext cx="1151446" cy="415398"/>
+          </a:xfrm>
+          <a:prstGeom prst="diamond">
+            <a:avLst/>
+          </a:prstGeom>
+          <a:noFill/>
+        </p:spPr>
+        <p:style>
+          <a:lnRef idx="2">
+            <a:schemeClr val="accent1">
+              <a:shade val="50000"/>
+            </a:schemeClr>
+          </a:lnRef>
+          <a:fillRef idx="1">
+            <a:schemeClr val="accent1"/>
+          </a:fillRef>
+          <a:effectRef idx="0">
+            <a:schemeClr val="accent1"/>
+          </a:effectRef>
+          <a:fontRef idx="minor">
+            <a:schemeClr val="lt1"/>
+          </a:fontRef>
+        </p:style>
+        <p:txBody>
+          <a:bodyPr rtlCol="0" anchor="ctr"/>
+          <a:p>
+            <a:pPr algn="ctr"/>
+            <a:r>
+              <a:rPr lang="en-US" sz="1105">
+                <a:solidFill>
+                  <a:schemeClr val="tx1"/>
+                </a:solidFill>
+              </a:rPr>
+              <a:t>Vis6</a:t>
+            </a:r>
+            <a:endParaRPr lang="en-US" sz="1105">
+              <a:solidFill>
+                <a:schemeClr val="tx1"/>
+              </a:solidFill>
+            </a:endParaRPr>
+          </a:p>
+        </p:txBody>
+      </p:sp>
+      <p:cxnSp>
+        <p:nvCxnSpPr>
+          <p:cNvPr id="28" name="Straight Arrow Connector 27"/>
+          <p:cNvCxnSpPr>
+            <a:stCxn id="23" idx="2"/>
+            <a:endCxn id="27" idx="0"/>
+          </p:cNvCxnSpPr>
+          <p:nvPr/>
+        </p:nvCxnSpPr>
+        <p:spPr>
+          <a:xfrm flipH="1">
+            <a:off x="7661619" y="1815470"/>
+            <a:ext cx="548" cy="284021"/>
+          </a:xfrm>
+          <a:prstGeom prst="straightConnector1">
+            <a:avLst/>
+          </a:prstGeom>
+          <a:ln w="19050">
+            <a:solidFill>
+              <a:schemeClr val="tx1"/>
+            </a:solidFill>
+            <a:tailEnd type="arrow"/>
+          </a:ln>
+        </p:spPr>
+        <p:style>
+          <a:lnRef idx="1">
+            <a:schemeClr val="accent1"/>
+          </a:lnRef>
+          <a:fillRef idx="0">
+            <a:schemeClr val="accent1"/>
+          </a:fillRef>
+          <a:effectRef idx="0">
+            <a:schemeClr val="accent1"/>
+          </a:effectRef>
+          <a:fontRef idx="minor">
+            <a:schemeClr val="tx1"/>
+          </a:fontRef>
+        </p:style>
+      </p:cxnSp>
     </p:spTree>
   </p:cSld>
   <p:clrMapOvr>

</xml_diff>

<commit_message>
Changed the DAG diagram. Checkpoint.
</commit_message>
<xml_diff>
--- a/figures/prompt_dag_1.pptx
+++ b/figures/prompt_dag_1.pptx
@@ -3769,6 +3769,382 @@
           </a:fontRef>
         </p:style>
       </p:cxnSp>
+      <p:sp>
+        <p:nvSpPr>
+          <p:cNvPr id="2" name="Oval 1"/>
+          <p:cNvSpPr/>
+          <p:nvPr/>
+        </p:nvSpPr>
+        <p:spPr>
+          <a:xfrm>
+            <a:off x="2559050" y="655955"/>
+            <a:ext cx="1198880" cy="415290"/>
+          </a:xfrm>
+          <a:prstGeom prst="ellipse">
+            <a:avLst/>
+          </a:prstGeom>
+          <a:noFill/>
+        </p:spPr>
+        <p:style>
+          <a:lnRef idx="2">
+            <a:schemeClr val="accent1">
+              <a:shade val="50000"/>
+            </a:schemeClr>
+          </a:lnRef>
+          <a:fillRef idx="1">
+            <a:schemeClr val="accent1"/>
+          </a:fillRef>
+          <a:effectRef idx="0">
+            <a:schemeClr val="accent1"/>
+          </a:effectRef>
+          <a:fontRef idx="minor">
+            <a:schemeClr val="lt1"/>
+          </a:fontRef>
+        </p:style>
+        <p:txBody>
+          <a:bodyPr rtlCol="0" anchor="ctr"/>
+          <a:p>
+            <a:pPr algn="ctr"/>
+            <a:r>
+              <a:rPr lang="en-US" sz="970">
+                <a:solidFill>
+                  <a:srgbClr val="7030A0"/>
+                </a:solidFill>
+              </a:rPr>
+              <a:t>Vis product 1</a:t>
+            </a:r>
+            <a:endParaRPr lang="en-US" sz="970">
+              <a:solidFill>
+                <a:srgbClr val="7030A0"/>
+              </a:solidFill>
+            </a:endParaRPr>
+          </a:p>
+        </p:txBody>
+      </p:sp>
+      <p:cxnSp>
+        <p:nvCxnSpPr>
+          <p:cNvPr id="3" name="Straight Arrow Connector 2"/>
+          <p:cNvCxnSpPr>
+            <a:stCxn id="9" idx="3"/>
+            <a:endCxn id="2" idx="2"/>
+          </p:cNvCxnSpPr>
+          <p:nvPr/>
+        </p:nvCxnSpPr>
+        <p:spPr>
+          <a:xfrm>
+            <a:off x="2418080" y="863600"/>
+            <a:ext cx="140970" cy="0"/>
+          </a:xfrm>
+          <a:prstGeom prst="straightConnector1">
+            <a:avLst/>
+          </a:prstGeom>
+          <a:ln w="19050">
+            <a:solidFill>
+              <a:srgbClr val="7030A0"/>
+            </a:solidFill>
+            <a:tailEnd type="arrow"/>
+          </a:ln>
+        </p:spPr>
+        <p:style>
+          <a:lnRef idx="1">
+            <a:schemeClr val="accent1"/>
+          </a:lnRef>
+          <a:fillRef idx="0">
+            <a:schemeClr val="accent1"/>
+          </a:fillRef>
+          <a:effectRef idx="0">
+            <a:schemeClr val="accent1"/>
+          </a:effectRef>
+          <a:fontRef idx="minor">
+            <a:schemeClr val="tx1"/>
+          </a:fontRef>
+        </p:style>
+      </p:cxnSp>
+      <p:sp>
+        <p:nvSpPr>
+          <p:cNvPr id="12" name="Oval 11"/>
+          <p:cNvSpPr/>
+          <p:nvPr/>
+        </p:nvSpPr>
+        <p:spPr>
+          <a:xfrm>
+            <a:off x="2559050" y="2099310"/>
+            <a:ext cx="1198880" cy="415290"/>
+          </a:xfrm>
+          <a:prstGeom prst="ellipse">
+            <a:avLst/>
+          </a:prstGeom>
+          <a:noFill/>
+        </p:spPr>
+        <p:style>
+          <a:lnRef idx="2">
+            <a:schemeClr val="accent1">
+              <a:shade val="50000"/>
+            </a:schemeClr>
+          </a:lnRef>
+          <a:fillRef idx="1">
+            <a:schemeClr val="accent1"/>
+          </a:fillRef>
+          <a:effectRef idx="0">
+            <a:schemeClr val="accent1"/>
+          </a:effectRef>
+          <a:fontRef idx="minor">
+            <a:schemeClr val="lt1"/>
+          </a:fontRef>
+        </p:style>
+        <p:txBody>
+          <a:bodyPr rtlCol="0" anchor="ctr"/>
+          <a:p>
+            <a:pPr algn="ctr"/>
+            <a:r>
+              <a:rPr lang="en-US" sz="970">
+                <a:solidFill>
+                  <a:srgbClr val="7030A0"/>
+                </a:solidFill>
+              </a:rPr>
+              <a:t>Vis product 2</a:t>
+            </a:r>
+            <a:endParaRPr lang="en-US" sz="970">
+              <a:solidFill>
+                <a:srgbClr val="7030A0"/>
+              </a:solidFill>
+            </a:endParaRPr>
+          </a:p>
+        </p:txBody>
+      </p:sp>
+      <p:cxnSp>
+        <p:nvCxnSpPr>
+          <p:cNvPr id="13" name="Straight Arrow Connector 12"/>
+          <p:cNvCxnSpPr>
+            <a:stCxn id="7" idx="3"/>
+            <a:endCxn id="12" idx="2"/>
+          </p:cNvCxnSpPr>
+          <p:nvPr/>
+        </p:nvCxnSpPr>
+        <p:spPr>
+          <a:xfrm flipV="1">
+            <a:off x="2418080" y="2306955"/>
+            <a:ext cx="140970" cy="635"/>
+          </a:xfrm>
+          <a:prstGeom prst="straightConnector1">
+            <a:avLst/>
+          </a:prstGeom>
+          <a:ln w="19050">
+            <a:solidFill>
+              <a:srgbClr val="7030A0"/>
+            </a:solidFill>
+            <a:tailEnd type="arrow"/>
+          </a:ln>
+        </p:spPr>
+        <p:style>
+          <a:lnRef idx="1">
+            <a:schemeClr val="accent1"/>
+          </a:lnRef>
+          <a:fillRef idx="0">
+            <a:schemeClr val="accent1"/>
+          </a:fillRef>
+          <a:effectRef idx="0">
+            <a:schemeClr val="accent1"/>
+          </a:effectRef>
+          <a:fontRef idx="minor">
+            <a:schemeClr val="tx1"/>
+          </a:fontRef>
+        </p:style>
+      </p:cxnSp>
+      <p:sp>
+        <p:nvSpPr>
+          <p:cNvPr id="29" name="Oval 28"/>
+          <p:cNvSpPr/>
+          <p:nvPr/>
+        </p:nvSpPr>
+        <p:spPr>
+          <a:xfrm>
+            <a:off x="5233670" y="655955"/>
+            <a:ext cx="1515745" cy="415290"/>
+          </a:xfrm>
+          <a:prstGeom prst="ellipse">
+            <a:avLst/>
+          </a:prstGeom>
+          <a:noFill/>
+        </p:spPr>
+        <p:style>
+          <a:lnRef idx="2">
+            <a:schemeClr val="accent1">
+              <a:shade val="50000"/>
+            </a:schemeClr>
+          </a:lnRef>
+          <a:fillRef idx="1">
+            <a:schemeClr val="accent1"/>
+          </a:fillRef>
+          <a:effectRef idx="0">
+            <a:schemeClr val="accent1"/>
+          </a:effectRef>
+          <a:fontRef idx="minor">
+            <a:schemeClr val="lt1"/>
+          </a:fontRef>
+        </p:style>
+        <p:txBody>
+          <a:bodyPr rtlCol="0" anchor="ctr"/>
+          <a:p>
+            <a:pPr algn="ctr"/>
+            <a:r>
+              <a:rPr lang="en-US" sz="970">
+                <a:solidFill>
+                  <a:schemeClr val="accent6">
+                    <a:lumMod val="75000"/>
+                  </a:schemeClr>
+                </a:solidFill>
+              </a:rPr>
+              <a:t>Vis product 3</a:t>
+            </a:r>
+            <a:endParaRPr lang="en-US" sz="970">
+              <a:solidFill>
+                <a:schemeClr val="accent6">
+                  <a:lumMod val="75000"/>
+                </a:schemeClr>
+              </a:solidFill>
+            </a:endParaRPr>
+          </a:p>
+        </p:txBody>
+      </p:sp>
+      <p:sp>
+        <p:nvSpPr>
+          <p:cNvPr id="30" name="Oval 29"/>
+          <p:cNvSpPr/>
+          <p:nvPr/>
+        </p:nvSpPr>
+        <p:spPr>
+          <a:xfrm>
+            <a:off x="5309870" y="2099945"/>
+            <a:ext cx="1515745" cy="415290"/>
+          </a:xfrm>
+          <a:prstGeom prst="ellipse">
+            <a:avLst/>
+          </a:prstGeom>
+          <a:noFill/>
+        </p:spPr>
+        <p:style>
+          <a:lnRef idx="2">
+            <a:schemeClr val="accent1">
+              <a:shade val="50000"/>
+            </a:schemeClr>
+          </a:lnRef>
+          <a:fillRef idx="1">
+            <a:schemeClr val="accent1"/>
+          </a:fillRef>
+          <a:effectRef idx="0">
+            <a:schemeClr val="accent1"/>
+          </a:effectRef>
+          <a:fontRef idx="minor">
+            <a:schemeClr val="lt1"/>
+          </a:fontRef>
+        </p:style>
+        <p:txBody>
+          <a:bodyPr rtlCol="0" anchor="ctr"/>
+          <a:p>
+            <a:pPr algn="ctr"/>
+            <a:r>
+              <a:rPr lang="en-US" sz="970">
+                <a:solidFill>
+                  <a:schemeClr val="accent6">
+                    <a:lumMod val="75000"/>
+                  </a:schemeClr>
+                </a:solidFill>
+              </a:rPr>
+              <a:t>Vis product 3</a:t>
+            </a:r>
+            <a:endParaRPr lang="en-US" sz="970">
+              <a:solidFill>
+                <a:schemeClr val="accent6">
+                  <a:lumMod val="75000"/>
+                </a:schemeClr>
+              </a:solidFill>
+            </a:endParaRPr>
+          </a:p>
+        </p:txBody>
+      </p:sp>
+      <p:cxnSp>
+        <p:nvCxnSpPr>
+          <p:cNvPr id="31" name="Straight Arrow Connector 30"/>
+          <p:cNvCxnSpPr>
+            <a:stCxn id="17" idx="3"/>
+            <a:endCxn id="29" idx="2"/>
+          </p:cNvCxnSpPr>
+          <p:nvPr/>
+        </p:nvCxnSpPr>
+        <p:spPr>
+          <a:xfrm>
+            <a:off x="5049520" y="863600"/>
+            <a:ext cx="184150" cy="0"/>
+          </a:xfrm>
+          <a:prstGeom prst="straightConnector1">
+            <a:avLst/>
+          </a:prstGeom>
+          <a:ln w="19050">
+            <a:solidFill>
+              <a:schemeClr val="accent6">
+                <a:lumMod val="75000"/>
+              </a:schemeClr>
+            </a:solidFill>
+            <a:tailEnd type="arrow"/>
+          </a:ln>
+        </p:spPr>
+        <p:style>
+          <a:lnRef idx="1">
+            <a:schemeClr val="accent1"/>
+          </a:lnRef>
+          <a:fillRef idx="0">
+            <a:schemeClr val="accent1"/>
+          </a:fillRef>
+          <a:effectRef idx="0">
+            <a:schemeClr val="accent1"/>
+          </a:effectRef>
+          <a:fontRef idx="minor">
+            <a:schemeClr val="tx1"/>
+          </a:fontRef>
+        </p:style>
+      </p:cxnSp>
+      <p:cxnSp>
+        <p:nvCxnSpPr>
+          <p:cNvPr id="32" name="Straight Arrow Connector 31"/>
+          <p:cNvCxnSpPr>
+            <a:stCxn id="19" idx="3"/>
+            <a:endCxn id="30" idx="2"/>
+          </p:cNvCxnSpPr>
+          <p:nvPr/>
+        </p:nvCxnSpPr>
+        <p:spPr>
+          <a:xfrm>
+            <a:off x="5049520" y="2307590"/>
+            <a:ext cx="260350" cy="0"/>
+          </a:xfrm>
+          <a:prstGeom prst="straightConnector1">
+            <a:avLst/>
+          </a:prstGeom>
+          <a:ln w="19050">
+            <a:solidFill>
+              <a:schemeClr val="accent6">
+                <a:lumMod val="75000"/>
+              </a:schemeClr>
+            </a:solidFill>
+            <a:tailEnd type="arrow"/>
+          </a:ln>
+        </p:spPr>
+        <p:style>
+          <a:lnRef idx="1">
+            <a:schemeClr val="accent1"/>
+          </a:lnRef>
+          <a:fillRef idx="0">
+            <a:schemeClr val="accent1"/>
+          </a:fillRef>
+          <a:effectRef idx="0">
+            <a:schemeClr val="accent1"/>
+          </a:effectRef>
+          <a:fontRef idx="minor">
+            <a:schemeClr val="tx1"/>
+          </a:fontRef>
+        </p:style>
+      </p:cxnSp>
     </p:spTree>
   </p:cSld>
   <p:clrMapOvr>

</xml_diff>